<commit_message>
manuscript figures and tables
</commit_message>
<xml_diff>
--- a/manuscript/manuscript-figures/heatmap/Presentation1.pptx
+++ b/manuscript/manuscript-figures/heatmap/Presentation1.pptx
@@ -7,6 +7,11 @@
   <p:sldIdLst>
     <p:sldId id="256" r:id="rId2"/>
     <p:sldId id="257" r:id="rId3"/>
+    <p:sldId id="258" r:id="rId4"/>
+    <p:sldId id="259" r:id="rId5"/>
+    <p:sldId id="260" r:id="rId6"/>
+    <p:sldId id="261" r:id="rId7"/>
+    <p:sldId id="262" r:id="rId8"/>
   </p:sldIdLst>
   <p:sldSz cx="12192000" cy="6858000"/>
   <p:notesSz cx="6858000" cy="9144000"/>
@@ -273,7 +278,7 @@
           <a:p>
             <a:fld id="{4C61F7E7-8B6D-044F-BB35-E997950EE35D}" type="datetimeFigureOut">
               <a:rPr lang="en-DK" smtClean="0"/>
-              <a:t>18/04/2023</a:t>
+              <a:t>27/04/2023</a:t>
             </a:fld>
             <a:endParaRPr lang="en-DK"/>
           </a:p>
@@ -473,7 +478,7 @@
           <a:p>
             <a:fld id="{4C61F7E7-8B6D-044F-BB35-E997950EE35D}" type="datetimeFigureOut">
               <a:rPr lang="en-DK" smtClean="0"/>
-              <a:t>18/04/2023</a:t>
+              <a:t>27/04/2023</a:t>
             </a:fld>
             <a:endParaRPr lang="en-DK"/>
           </a:p>
@@ -683,7 +688,7 @@
           <a:p>
             <a:fld id="{4C61F7E7-8B6D-044F-BB35-E997950EE35D}" type="datetimeFigureOut">
               <a:rPr lang="en-DK" smtClean="0"/>
-              <a:t>18/04/2023</a:t>
+              <a:t>27/04/2023</a:t>
             </a:fld>
             <a:endParaRPr lang="en-DK"/>
           </a:p>
@@ -883,7 +888,7 @@
           <a:p>
             <a:fld id="{4C61F7E7-8B6D-044F-BB35-E997950EE35D}" type="datetimeFigureOut">
               <a:rPr lang="en-DK" smtClean="0"/>
-              <a:t>18/04/2023</a:t>
+              <a:t>27/04/2023</a:t>
             </a:fld>
             <a:endParaRPr lang="en-DK"/>
           </a:p>
@@ -1159,7 +1164,7 @@
           <a:p>
             <a:fld id="{4C61F7E7-8B6D-044F-BB35-E997950EE35D}" type="datetimeFigureOut">
               <a:rPr lang="en-DK" smtClean="0"/>
-              <a:t>18/04/2023</a:t>
+              <a:t>27/04/2023</a:t>
             </a:fld>
             <a:endParaRPr lang="en-DK"/>
           </a:p>
@@ -1427,7 +1432,7 @@
           <a:p>
             <a:fld id="{4C61F7E7-8B6D-044F-BB35-E997950EE35D}" type="datetimeFigureOut">
               <a:rPr lang="en-DK" smtClean="0"/>
-              <a:t>18/04/2023</a:t>
+              <a:t>27/04/2023</a:t>
             </a:fld>
             <a:endParaRPr lang="en-DK"/>
           </a:p>
@@ -1842,7 +1847,7 @@
           <a:p>
             <a:fld id="{4C61F7E7-8B6D-044F-BB35-E997950EE35D}" type="datetimeFigureOut">
               <a:rPr lang="en-DK" smtClean="0"/>
-              <a:t>18/04/2023</a:t>
+              <a:t>27/04/2023</a:t>
             </a:fld>
             <a:endParaRPr lang="en-DK"/>
           </a:p>
@@ -1984,7 +1989,7 @@
           <a:p>
             <a:fld id="{4C61F7E7-8B6D-044F-BB35-E997950EE35D}" type="datetimeFigureOut">
               <a:rPr lang="en-DK" smtClean="0"/>
-              <a:t>18/04/2023</a:t>
+              <a:t>27/04/2023</a:t>
             </a:fld>
             <a:endParaRPr lang="en-DK"/>
           </a:p>
@@ -2097,7 +2102,7 @@
           <a:p>
             <a:fld id="{4C61F7E7-8B6D-044F-BB35-E997950EE35D}" type="datetimeFigureOut">
               <a:rPr lang="en-DK" smtClean="0"/>
-              <a:t>18/04/2023</a:t>
+              <a:t>27/04/2023</a:t>
             </a:fld>
             <a:endParaRPr lang="en-DK"/>
           </a:p>
@@ -2410,7 +2415,7 @@
           <a:p>
             <a:fld id="{4C61F7E7-8B6D-044F-BB35-E997950EE35D}" type="datetimeFigureOut">
               <a:rPr lang="en-DK" smtClean="0"/>
-              <a:t>18/04/2023</a:t>
+              <a:t>27/04/2023</a:t>
             </a:fld>
             <a:endParaRPr lang="en-DK"/>
           </a:p>
@@ -2699,7 +2704,7 @@
           <a:p>
             <a:fld id="{4C61F7E7-8B6D-044F-BB35-E997950EE35D}" type="datetimeFigureOut">
               <a:rPr lang="en-DK" smtClean="0"/>
-              <a:t>18/04/2023</a:t>
+              <a:t>27/04/2023</a:t>
             </a:fld>
             <a:endParaRPr lang="en-DK"/>
           </a:p>
@@ -2942,7 +2947,7 @@
           <a:p>
             <a:fld id="{4C61F7E7-8B6D-044F-BB35-E997950EE35D}" type="datetimeFigureOut">
               <a:rPr lang="en-DK" smtClean="0"/>
-              <a:t>18/04/2023</a:t>
+              <a:t>27/04/2023</a:t>
             </a:fld>
             <a:endParaRPr lang="en-DK"/>
           </a:p>
@@ -3815,6 +3820,1424 @@
 </p:sld>
 </file>
 
+<file path=ppt/slides/slide3.xml><?xml version="1.0" encoding="utf-8"?>
+<p:sld xmlns:a="http://schemas.openxmlformats.org/drawingml/2006/main" xmlns:r="http://schemas.openxmlformats.org/officeDocument/2006/relationships" xmlns:p="http://schemas.openxmlformats.org/presentationml/2006/main">
+  <p:cSld>
+    <p:spTree>
+      <p:nvGrpSpPr>
+        <p:cNvPr id="1" name=""/>
+        <p:cNvGrpSpPr/>
+        <p:nvPr/>
+      </p:nvGrpSpPr>
+      <p:grpSpPr>
+        <a:xfrm>
+          <a:off x="0" y="0"/>
+          <a:ext cx="0" cy="0"/>
+          <a:chOff x="0" y="0"/>
+          <a:chExt cx="0" cy="0"/>
+        </a:xfrm>
+      </p:grpSpPr>
+      <p:pic>
+        <p:nvPicPr>
+          <p:cNvPr id="3" name="Picture 2">
+            <a:extLst>
+              <a:ext uri="{FF2B5EF4-FFF2-40B4-BE49-F238E27FC236}">
+                <a16:creationId xmlns:a16="http://schemas.microsoft.com/office/drawing/2014/main" id="{9EA69F26-FE42-A1C5-E3E0-B52B717A46F9}"/>
+              </a:ext>
+            </a:extLst>
+          </p:cNvPr>
+          <p:cNvPicPr>
+            <a:picLocks noChangeAspect="1"/>
+          </p:cNvPicPr>
+          <p:nvPr/>
+        </p:nvPicPr>
+        <p:blipFill>
+          <a:blip r:embed="rId2"/>
+          <a:stretch>
+            <a:fillRect/>
+          </a:stretch>
+        </p:blipFill>
+        <p:spPr>
+          <a:xfrm>
+            <a:off x="4634854" y="1059522"/>
+            <a:ext cx="5778500" cy="4800600"/>
+          </a:xfrm>
+          <a:prstGeom prst="rect">
+            <a:avLst/>
+          </a:prstGeom>
+        </p:spPr>
+      </p:pic>
+      <p:cxnSp>
+        <p:nvCxnSpPr>
+          <p:cNvPr id="5" name="Straight Connector 4">
+            <a:extLst>
+              <a:ext uri="{FF2B5EF4-FFF2-40B4-BE49-F238E27FC236}">
+                <a16:creationId xmlns:a16="http://schemas.microsoft.com/office/drawing/2014/main" id="{D837FEDE-A8EF-F261-DA22-048A4976C541}"/>
+              </a:ext>
+            </a:extLst>
+          </p:cNvPr>
+          <p:cNvCxnSpPr>
+            <a:cxnSpLocks/>
+          </p:cNvCxnSpPr>
+          <p:nvPr/>
+        </p:nvCxnSpPr>
+        <p:spPr>
+          <a:xfrm>
+            <a:off x="5969278" y="4280090"/>
+            <a:ext cx="3626778" cy="0"/>
+          </a:xfrm>
+          <a:prstGeom prst="line">
+            <a:avLst/>
+          </a:prstGeom>
+          <a:ln w="9525"/>
+        </p:spPr>
+        <p:style>
+          <a:lnRef idx="1">
+            <a:schemeClr val="dk1"/>
+          </a:lnRef>
+          <a:fillRef idx="0">
+            <a:schemeClr val="dk1"/>
+          </a:fillRef>
+          <a:effectRef idx="0">
+            <a:schemeClr val="dk1"/>
+          </a:effectRef>
+          <a:fontRef idx="minor">
+            <a:schemeClr val="tx1"/>
+          </a:fontRef>
+        </p:style>
+      </p:cxnSp>
+      <p:cxnSp>
+        <p:nvCxnSpPr>
+          <p:cNvPr id="6" name="Straight Connector 5">
+            <a:extLst>
+              <a:ext uri="{FF2B5EF4-FFF2-40B4-BE49-F238E27FC236}">
+                <a16:creationId xmlns:a16="http://schemas.microsoft.com/office/drawing/2014/main" id="{F5137D28-A8B3-89E6-F8C8-B976F9F69FDF}"/>
+              </a:ext>
+            </a:extLst>
+          </p:cNvPr>
+          <p:cNvCxnSpPr>
+            <a:cxnSpLocks/>
+          </p:cNvCxnSpPr>
+          <p:nvPr/>
+        </p:nvCxnSpPr>
+        <p:spPr>
+          <a:xfrm>
+            <a:off x="5969278" y="2836694"/>
+            <a:ext cx="3626778" cy="0"/>
+          </a:xfrm>
+          <a:prstGeom prst="line">
+            <a:avLst/>
+          </a:prstGeom>
+          <a:ln w="9525"/>
+        </p:spPr>
+        <p:style>
+          <a:lnRef idx="1">
+            <a:schemeClr val="dk1"/>
+          </a:lnRef>
+          <a:fillRef idx="0">
+            <a:schemeClr val="dk1"/>
+          </a:fillRef>
+          <a:effectRef idx="0">
+            <a:schemeClr val="dk1"/>
+          </a:effectRef>
+          <a:fontRef idx="minor">
+            <a:schemeClr val="tx1"/>
+          </a:fontRef>
+        </p:style>
+      </p:cxnSp>
+      <p:sp>
+        <p:nvSpPr>
+          <p:cNvPr id="20" name="TextBox 19">
+            <a:extLst>
+              <a:ext uri="{FF2B5EF4-FFF2-40B4-BE49-F238E27FC236}">
+                <a16:creationId xmlns:a16="http://schemas.microsoft.com/office/drawing/2014/main" id="{2DC4938C-F01F-451F-C445-51BFFFE57926}"/>
+              </a:ext>
+            </a:extLst>
+          </p:cNvPr>
+          <p:cNvSpPr txBox="1"/>
+          <p:nvPr/>
+        </p:nvSpPr>
+        <p:spPr>
+          <a:xfrm>
+            <a:off x="1383209" y="1930174"/>
+            <a:ext cx="583493" cy="307777"/>
+          </a:xfrm>
+          <a:prstGeom prst="rect">
+            <a:avLst/>
+          </a:prstGeom>
+          <a:noFill/>
+        </p:spPr>
+        <p:txBody>
+          <a:bodyPr wrap="none" rtlCol="0">
+            <a:spAutoFit/>
+          </a:bodyPr>
+          <a:lstStyle/>
+          <a:p>
+            <a:r>
+              <a:rPr lang="en-DK" sz="1400" b="1" dirty="0"/>
+              <a:t>GT-C</a:t>
+            </a:r>
+            <a:r>
+              <a:rPr lang="en-DK" sz="1400" b="1" baseline="-25000" dirty="0"/>
+              <a:t>1</a:t>
+            </a:r>
+            <a:endParaRPr lang="en-DK" sz="1400" b="1" dirty="0"/>
+          </a:p>
+        </p:txBody>
+      </p:sp>
+      <p:sp>
+        <p:nvSpPr>
+          <p:cNvPr id="21" name="TextBox 20">
+            <a:extLst>
+              <a:ext uri="{FF2B5EF4-FFF2-40B4-BE49-F238E27FC236}">
+                <a16:creationId xmlns:a16="http://schemas.microsoft.com/office/drawing/2014/main" id="{A6B93990-D03D-E792-F89F-59A3B0CCE576}"/>
+              </a:ext>
+            </a:extLst>
+          </p:cNvPr>
+          <p:cNvSpPr txBox="1"/>
+          <p:nvPr/>
+        </p:nvSpPr>
+        <p:spPr>
+          <a:xfrm>
+            <a:off x="1383209" y="3388768"/>
+            <a:ext cx="583493" cy="307777"/>
+          </a:xfrm>
+          <a:prstGeom prst="rect">
+            <a:avLst/>
+          </a:prstGeom>
+          <a:noFill/>
+        </p:spPr>
+        <p:txBody>
+          <a:bodyPr wrap="none" rtlCol="0">
+            <a:spAutoFit/>
+          </a:bodyPr>
+          <a:lstStyle/>
+          <a:p>
+            <a:r>
+              <a:rPr lang="en-DK" sz="1400" b="1" dirty="0"/>
+              <a:t>GT-C</a:t>
+            </a:r>
+            <a:r>
+              <a:rPr lang="en-DK" sz="1400" b="1" baseline="-25000" dirty="0"/>
+              <a:t>2</a:t>
+            </a:r>
+            <a:endParaRPr lang="en-DK" sz="1400" b="1" dirty="0"/>
+          </a:p>
+        </p:txBody>
+      </p:sp>
+      <p:sp>
+        <p:nvSpPr>
+          <p:cNvPr id="8" name="Right Brace 7">
+            <a:extLst>
+              <a:ext uri="{FF2B5EF4-FFF2-40B4-BE49-F238E27FC236}">
+                <a16:creationId xmlns:a16="http://schemas.microsoft.com/office/drawing/2014/main" id="{E6CE1269-1BB0-F9CC-5BCE-45B6FB0D7F56}"/>
+              </a:ext>
+            </a:extLst>
+          </p:cNvPr>
+          <p:cNvSpPr/>
+          <p:nvPr/>
+        </p:nvSpPr>
+        <p:spPr>
+          <a:xfrm rot="10800000">
+            <a:off x="1962462" y="1417148"/>
+            <a:ext cx="127838" cy="1405258"/>
+          </a:xfrm>
+          <a:prstGeom prst="rightBrace">
+            <a:avLst/>
+          </a:prstGeom>
+          <a:ln w="9525"/>
+        </p:spPr>
+        <p:style>
+          <a:lnRef idx="1">
+            <a:schemeClr val="dk1"/>
+          </a:lnRef>
+          <a:fillRef idx="0">
+            <a:schemeClr val="dk1"/>
+          </a:fillRef>
+          <a:effectRef idx="0">
+            <a:schemeClr val="dk1"/>
+          </a:effectRef>
+          <a:fontRef idx="minor">
+            <a:schemeClr val="tx1"/>
+          </a:fontRef>
+        </p:style>
+        <p:txBody>
+          <a:bodyPr rtlCol="0" anchor="ctr"/>
+          <a:lstStyle/>
+          <a:p>
+            <a:pPr algn="ctr"/>
+            <a:endParaRPr lang="en-DK"/>
+          </a:p>
+        </p:txBody>
+      </p:sp>
+      <p:sp>
+        <p:nvSpPr>
+          <p:cNvPr id="9" name="Right Brace 8">
+            <a:extLst>
+              <a:ext uri="{FF2B5EF4-FFF2-40B4-BE49-F238E27FC236}">
+                <a16:creationId xmlns:a16="http://schemas.microsoft.com/office/drawing/2014/main" id="{8747F4E6-2884-E658-8747-FA4D7E4F7BC1}"/>
+              </a:ext>
+            </a:extLst>
+          </p:cNvPr>
+          <p:cNvSpPr/>
+          <p:nvPr/>
+        </p:nvSpPr>
+        <p:spPr>
+          <a:xfrm rot="10800000">
+            <a:off x="1946057" y="2875430"/>
+            <a:ext cx="144243" cy="1356932"/>
+          </a:xfrm>
+          <a:prstGeom prst="rightBrace">
+            <a:avLst/>
+          </a:prstGeom>
+          <a:ln w="9525"/>
+        </p:spPr>
+        <p:style>
+          <a:lnRef idx="1">
+            <a:schemeClr val="dk1"/>
+          </a:lnRef>
+          <a:fillRef idx="0">
+            <a:schemeClr val="dk1"/>
+          </a:fillRef>
+          <a:effectRef idx="0">
+            <a:schemeClr val="dk1"/>
+          </a:effectRef>
+          <a:fontRef idx="minor">
+            <a:schemeClr val="tx1"/>
+          </a:fontRef>
+        </p:style>
+        <p:txBody>
+          <a:bodyPr rtlCol="0" anchor="ctr"/>
+          <a:lstStyle/>
+          <a:p>
+            <a:pPr algn="ctr"/>
+            <a:endParaRPr lang="en-DK"/>
+          </a:p>
+        </p:txBody>
+      </p:sp>
+      <p:cxnSp>
+        <p:nvCxnSpPr>
+          <p:cNvPr id="7" name="Straight Connector 6">
+            <a:extLst>
+              <a:ext uri="{FF2B5EF4-FFF2-40B4-BE49-F238E27FC236}">
+                <a16:creationId xmlns:a16="http://schemas.microsoft.com/office/drawing/2014/main" id="{CC1E5BF1-B6EA-4B12-0540-DE0968FCE667}"/>
+              </a:ext>
+            </a:extLst>
+          </p:cNvPr>
+          <p:cNvCxnSpPr>
+            <a:cxnSpLocks/>
+          </p:cNvCxnSpPr>
+          <p:nvPr/>
+        </p:nvCxnSpPr>
+        <p:spPr>
+          <a:xfrm>
+            <a:off x="5969278" y="1386326"/>
+            <a:ext cx="3626778" cy="0"/>
+          </a:xfrm>
+          <a:prstGeom prst="line">
+            <a:avLst/>
+          </a:prstGeom>
+          <a:ln w="9525"/>
+        </p:spPr>
+        <p:style>
+          <a:lnRef idx="1">
+            <a:schemeClr val="dk1"/>
+          </a:lnRef>
+          <a:fillRef idx="0">
+            <a:schemeClr val="dk1"/>
+          </a:fillRef>
+          <a:effectRef idx="0">
+            <a:schemeClr val="dk1"/>
+          </a:effectRef>
+          <a:fontRef idx="minor">
+            <a:schemeClr val="tx1"/>
+          </a:fontRef>
+        </p:style>
+      </p:cxnSp>
+      <p:pic>
+        <p:nvPicPr>
+          <p:cNvPr id="14" name="Graphic 13">
+            <a:extLst>
+              <a:ext uri="{FF2B5EF4-FFF2-40B4-BE49-F238E27FC236}">
+                <a16:creationId xmlns:a16="http://schemas.microsoft.com/office/drawing/2014/main" id="{76A379ED-05AE-0D02-A63E-A8B572BE934F}"/>
+              </a:ext>
+            </a:extLst>
+          </p:cNvPr>
+          <p:cNvPicPr>
+            <a:picLocks noChangeAspect="1"/>
+          </p:cNvPicPr>
+          <p:nvPr/>
+        </p:nvPicPr>
+        <p:blipFill rotWithShape="1">
+          <a:blip r:embed="rId3">
+            <a:extLst>
+              <a:ext uri="{96DAC541-7B7A-43D3-8B79-37D633B846F1}">
+                <asvg:svgBlip xmlns:asvg="http://schemas.microsoft.com/office/drawing/2016/SVG/main" r:embed="rId4"/>
+              </a:ext>
+            </a:extLst>
+          </a:blip>
+          <a:srcRect l="11132" t="18840" r="71682" b="39387"/>
+          <a:stretch/>
+        </p:blipFill>
+        <p:spPr>
+          <a:xfrm>
+            <a:off x="2063379" y="1096778"/>
+            <a:ext cx="2673005" cy="3686098"/>
+          </a:xfrm>
+          <a:prstGeom prst="rect">
+            <a:avLst/>
+          </a:prstGeom>
+        </p:spPr>
+      </p:pic>
+    </p:spTree>
+    <p:extLst>
+      <p:ext uri="{BB962C8B-B14F-4D97-AF65-F5344CB8AC3E}">
+        <p14:creationId xmlns:p14="http://schemas.microsoft.com/office/powerpoint/2010/main" val="1771117449"/>
+      </p:ext>
+    </p:extLst>
+  </p:cSld>
+  <p:clrMapOvr>
+    <a:masterClrMapping/>
+  </p:clrMapOvr>
+</p:sld>
+</file>
+
+<file path=ppt/slides/slide4.xml><?xml version="1.0" encoding="utf-8"?>
+<p:sld xmlns:a="http://schemas.openxmlformats.org/drawingml/2006/main" xmlns:r="http://schemas.openxmlformats.org/officeDocument/2006/relationships" xmlns:p="http://schemas.openxmlformats.org/presentationml/2006/main">
+  <p:cSld>
+    <p:spTree>
+      <p:nvGrpSpPr>
+        <p:cNvPr id="1" name=""/>
+        <p:cNvGrpSpPr/>
+        <p:nvPr/>
+      </p:nvGrpSpPr>
+      <p:grpSpPr>
+        <a:xfrm>
+          <a:off x="0" y="0"/>
+          <a:ext cx="0" cy="0"/>
+          <a:chOff x="0" y="0"/>
+          <a:chExt cx="0" cy="0"/>
+        </a:xfrm>
+      </p:grpSpPr>
+      <p:pic>
+        <p:nvPicPr>
+          <p:cNvPr id="16" name="Picture 15">
+            <a:extLst>
+              <a:ext uri="{FF2B5EF4-FFF2-40B4-BE49-F238E27FC236}">
+                <a16:creationId xmlns:a16="http://schemas.microsoft.com/office/drawing/2014/main" id="{364D7534-50A1-7CF2-CEF1-11ABC07DE547}"/>
+              </a:ext>
+            </a:extLst>
+          </p:cNvPr>
+          <p:cNvPicPr>
+            <a:picLocks noChangeAspect="1"/>
+          </p:cNvPicPr>
+          <p:nvPr/>
+        </p:nvPicPr>
+        <p:blipFill>
+          <a:blip r:embed="rId2"/>
+          <a:stretch>
+            <a:fillRect/>
+          </a:stretch>
+        </p:blipFill>
+        <p:spPr>
+          <a:xfrm>
+            <a:off x="4641326" y="1056311"/>
+            <a:ext cx="5778500" cy="4800600"/>
+          </a:xfrm>
+          <a:prstGeom prst="rect">
+            <a:avLst/>
+          </a:prstGeom>
+        </p:spPr>
+      </p:pic>
+      <p:cxnSp>
+        <p:nvCxnSpPr>
+          <p:cNvPr id="5" name="Straight Connector 4">
+            <a:extLst>
+              <a:ext uri="{FF2B5EF4-FFF2-40B4-BE49-F238E27FC236}">
+                <a16:creationId xmlns:a16="http://schemas.microsoft.com/office/drawing/2014/main" id="{D837FEDE-A8EF-F261-DA22-048A4976C541}"/>
+              </a:ext>
+            </a:extLst>
+          </p:cNvPr>
+          <p:cNvCxnSpPr>
+            <a:cxnSpLocks/>
+          </p:cNvCxnSpPr>
+          <p:nvPr/>
+        </p:nvCxnSpPr>
+        <p:spPr>
+          <a:xfrm>
+            <a:off x="5969278" y="1629253"/>
+            <a:ext cx="3626778" cy="0"/>
+          </a:xfrm>
+          <a:prstGeom prst="line">
+            <a:avLst/>
+          </a:prstGeom>
+          <a:ln w="9525"/>
+        </p:spPr>
+        <p:style>
+          <a:lnRef idx="1">
+            <a:schemeClr val="dk1"/>
+          </a:lnRef>
+          <a:fillRef idx="0">
+            <a:schemeClr val="dk1"/>
+          </a:fillRef>
+          <a:effectRef idx="0">
+            <a:schemeClr val="dk1"/>
+          </a:effectRef>
+          <a:fontRef idx="minor">
+            <a:schemeClr val="tx1"/>
+          </a:fontRef>
+        </p:style>
+      </p:cxnSp>
+      <p:cxnSp>
+        <p:nvCxnSpPr>
+          <p:cNvPr id="6" name="Straight Connector 5">
+            <a:extLst>
+              <a:ext uri="{FF2B5EF4-FFF2-40B4-BE49-F238E27FC236}">
+                <a16:creationId xmlns:a16="http://schemas.microsoft.com/office/drawing/2014/main" id="{F5137D28-A8B3-89E6-F8C8-B976F9F69FDF}"/>
+              </a:ext>
+            </a:extLst>
+          </p:cNvPr>
+          <p:cNvCxnSpPr>
+            <a:cxnSpLocks/>
+          </p:cNvCxnSpPr>
+          <p:nvPr/>
+        </p:nvCxnSpPr>
+        <p:spPr>
+          <a:xfrm>
+            <a:off x="5969278" y="3076837"/>
+            <a:ext cx="3626778" cy="0"/>
+          </a:xfrm>
+          <a:prstGeom prst="line">
+            <a:avLst/>
+          </a:prstGeom>
+          <a:ln w="9525"/>
+        </p:spPr>
+        <p:style>
+          <a:lnRef idx="1">
+            <a:schemeClr val="dk1"/>
+          </a:lnRef>
+          <a:fillRef idx="0">
+            <a:schemeClr val="dk1"/>
+          </a:fillRef>
+          <a:effectRef idx="0">
+            <a:schemeClr val="dk1"/>
+          </a:effectRef>
+          <a:fontRef idx="minor">
+            <a:schemeClr val="tx1"/>
+          </a:fontRef>
+        </p:style>
+      </p:cxnSp>
+      <p:sp>
+        <p:nvSpPr>
+          <p:cNvPr id="20" name="TextBox 19">
+            <a:extLst>
+              <a:ext uri="{FF2B5EF4-FFF2-40B4-BE49-F238E27FC236}">
+                <a16:creationId xmlns:a16="http://schemas.microsoft.com/office/drawing/2014/main" id="{2DC4938C-F01F-451F-C445-51BFFFE57926}"/>
+              </a:ext>
+            </a:extLst>
+          </p:cNvPr>
+          <p:cNvSpPr txBox="1"/>
+          <p:nvPr/>
+        </p:nvSpPr>
+        <p:spPr>
+          <a:xfrm>
+            <a:off x="1518382" y="2168712"/>
+            <a:ext cx="583493" cy="307777"/>
+          </a:xfrm>
+          <a:prstGeom prst="rect">
+            <a:avLst/>
+          </a:prstGeom>
+          <a:noFill/>
+        </p:spPr>
+        <p:txBody>
+          <a:bodyPr wrap="none" rtlCol="0">
+            <a:spAutoFit/>
+          </a:bodyPr>
+          <a:lstStyle/>
+          <a:p>
+            <a:r>
+              <a:rPr lang="en-DK" sz="1400" b="1" dirty="0"/>
+              <a:t>GT-C</a:t>
+            </a:r>
+            <a:r>
+              <a:rPr lang="en-DK" sz="1400" b="1" baseline="-25000" dirty="0"/>
+              <a:t>1</a:t>
+            </a:r>
+            <a:endParaRPr lang="en-DK" sz="1400" b="1" dirty="0"/>
+          </a:p>
+        </p:txBody>
+      </p:sp>
+      <p:sp>
+        <p:nvSpPr>
+          <p:cNvPr id="21" name="TextBox 20">
+            <a:extLst>
+              <a:ext uri="{FF2B5EF4-FFF2-40B4-BE49-F238E27FC236}">
+                <a16:creationId xmlns:a16="http://schemas.microsoft.com/office/drawing/2014/main" id="{A6B93990-D03D-E792-F89F-59A3B0CCE576}"/>
+              </a:ext>
+            </a:extLst>
+          </p:cNvPr>
+          <p:cNvSpPr txBox="1"/>
+          <p:nvPr/>
+        </p:nvSpPr>
+        <p:spPr>
+          <a:xfrm>
+            <a:off x="1518382" y="3627306"/>
+            <a:ext cx="583493" cy="307777"/>
+          </a:xfrm>
+          <a:prstGeom prst="rect">
+            <a:avLst/>
+          </a:prstGeom>
+          <a:noFill/>
+        </p:spPr>
+        <p:txBody>
+          <a:bodyPr wrap="none" rtlCol="0">
+            <a:spAutoFit/>
+          </a:bodyPr>
+          <a:lstStyle/>
+          <a:p>
+            <a:r>
+              <a:rPr lang="en-DK" sz="1400" b="1" dirty="0"/>
+              <a:t>GT-C</a:t>
+            </a:r>
+            <a:r>
+              <a:rPr lang="en-DK" sz="1400" b="1" baseline="-25000" dirty="0"/>
+              <a:t>2</a:t>
+            </a:r>
+            <a:endParaRPr lang="en-DK" sz="1400" b="1" dirty="0"/>
+          </a:p>
+        </p:txBody>
+      </p:sp>
+      <p:sp>
+        <p:nvSpPr>
+          <p:cNvPr id="8" name="Right Brace 7">
+            <a:extLst>
+              <a:ext uri="{FF2B5EF4-FFF2-40B4-BE49-F238E27FC236}">
+                <a16:creationId xmlns:a16="http://schemas.microsoft.com/office/drawing/2014/main" id="{E6CE1269-1BB0-F9CC-5BCE-45B6FB0D7F56}"/>
+              </a:ext>
+            </a:extLst>
+          </p:cNvPr>
+          <p:cNvSpPr/>
+          <p:nvPr/>
+        </p:nvSpPr>
+        <p:spPr>
+          <a:xfrm rot="10800000">
+            <a:off x="2097635" y="1655686"/>
+            <a:ext cx="127838" cy="1405258"/>
+          </a:xfrm>
+          <a:prstGeom prst="rightBrace">
+            <a:avLst/>
+          </a:prstGeom>
+          <a:ln w="9525"/>
+        </p:spPr>
+        <p:style>
+          <a:lnRef idx="1">
+            <a:schemeClr val="dk1"/>
+          </a:lnRef>
+          <a:fillRef idx="0">
+            <a:schemeClr val="dk1"/>
+          </a:fillRef>
+          <a:effectRef idx="0">
+            <a:schemeClr val="dk1"/>
+          </a:effectRef>
+          <a:fontRef idx="minor">
+            <a:schemeClr val="tx1"/>
+          </a:fontRef>
+        </p:style>
+        <p:txBody>
+          <a:bodyPr rtlCol="0" anchor="ctr"/>
+          <a:lstStyle/>
+          <a:p>
+            <a:pPr algn="ctr"/>
+            <a:endParaRPr lang="en-DK"/>
+          </a:p>
+        </p:txBody>
+      </p:sp>
+      <p:sp>
+        <p:nvSpPr>
+          <p:cNvPr id="9" name="Right Brace 8">
+            <a:extLst>
+              <a:ext uri="{FF2B5EF4-FFF2-40B4-BE49-F238E27FC236}">
+                <a16:creationId xmlns:a16="http://schemas.microsoft.com/office/drawing/2014/main" id="{8747F4E6-2884-E658-8747-FA4D7E4F7BC1}"/>
+              </a:ext>
+            </a:extLst>
+          </p:cNvPr>
+          <p:cNvSpPr/>
+          <p:nvPr/>
+        </p:nvSpPr>
+        <p:spPr>
+          <a:xfrm rot="10800000">
+            <a:off x="2081230" y="3113968"/>
+            <a:ext cx="144243" cy="1356932"/>
+          </a:xfrm>
+          <a:prstGeom prst="rightBrace">
+            <a:avLst/>
+          </a:prstGeom>
+          <a:ln w="9525"/>
+        </p:spPr>
+        <p:style>
+          <a:lnRef idx="1">
+            <a:schemeClr val="dk1"/>
+          </a:lnRef>
+          <a:fillRef idx="0">
+            <a:schemeClr val="dk1"/>
+          </a:fillRef>
+          <a:effectRef idx="0">
+            <a:schemeClr val="dk1"/>
+          </a:effectRef>
+          <a:fontRef idx="minor">
+            <a:schemeClr val="tx1"/>
+          </a:fontRef>
+        </p:style>
+        <p:txBody>
+          <a:bodyPr rtlCol="0" anchor="ctr"/>
+          <a:lstStyle/>
+          <a:p>
+            <a:pPr algn="ctr"/>
+            <a:endParaRPr lang="en-DK"/>
+          </a:p>
+        </p:txBody>
+      </p:sp>
+      <p:cxnSp>
+        <p:nvCxnSpPr>
+          <p:cNvPr id="7" name="Straight Connector 6">
+            <a:extLst>
+              <a:ext uri="{FF2B5EF4-FFF2-40B4-BE49-F238E27FC236}">
+                <a16:creationId xmlns:a16="http://schemas.microsoft.com/office/drawing/2014/main" id="{CC1E5BF1-B6EA-4B12-0540-DE0968FCE667}"/>
+              </a:ext>
+            </a:extLst>
+          </p:cNvPr>
+          <p:cNvCxnSpPr>
+            <a:cxnSpLocks/>
+          </p:cNvCxnSpPr>
+          <p:nvPr/>
+        </p:nvCxnSpPr>
+        <p:spPr>
+          <a:xfrm>
+            <a:off x="5969278" y="1386326"/>
+            <a:ext cx="3626778" cy="0"/>
+          </a:xfrm>
+          <a:prstGeom prst="line">
+            <a:avLst/>
+          </a:prstGeom>
+          <a:ln w="9525"/>
+        </p:spPr>
+        <p:style>
+          <a:lnRef idx="1">
+            <a:schemeClr val="dk1"/>
+          </a:lnRef>
+          <a:fillRef idx="0">
+            <a:schemeClr val="dk1"/>
+          </a:fillRef>
+          <a:effectRef idx="0">
+            <a:schemeClr val="dk1"/>
+          </a:effectRef>
+          <a:fontRef idx="minor">
+            <a:schemeClr val="tx1"/>
+          </a:fontRef>
+        </p:style>
+      </p:cxnSp>
+      <p:pic>
+        <p:nvPicPr>
+          <p:cNvPr id="4" name="Graphic 3">
+            <a:extLst>
+              <a:ext uri="{FF2B5EF4-FFF2-40B4-BE49-F238E27FC236}">
+                <a16:creationId xmlns:a16="http://schemas.microsoft.com/office/drawing/2014/main" id="{96DBA169-5BB1-B4CA-8DAD-7556C785A2CC}"/>
+              </a:ext>
+            </a:extLst>
+          </p:cNvPr>
+          <p:cNvPicPr>
+            <a:picLocks noChangeAspect="1"/>
+          </p:cNvPicPr>
+          <p:nvPr/>
+        </p:nvPicPr>
+        <p:blipFill rotWithShape="1">
+          <a:blip r:embed="rId3">
+            <a:extLst>
+              <a:ext uri="{96DAC541-7B7A-43D3-8B79-37D633B846F1}">
+                <asvg:svgBlip xmlns:asvg="http://schemas.microsoft.com/office/drawing/2016/SVG/main" r:embed="rId4"/>
+              </a:ext>
+            </a:extLst>
+          </a:blip>
+          <a:srcRect l="6819" t="12390" r="59211" b="37590"/>
+          <a:stretch/>
+        </p:blipFill>
+        <p:spPr>
+          <a:xfrm>
+            <a:off x="2118502" y="1018440"/>
+            <a:ext cx="2542348" cy="3448900"/>
+          </a:xfrm>
+          <a:prstGeom prst="rect">
+            <a:avLst/>
+          </a:prstGeom>
+        </p:spPr>
+      </p:pic>
+    </p:spTree>
+    <p:extLst>
+      <p:ext uri="{BB962C8B-B14F-4D97-AF65-F5344CB8AC3E}">
+        <p14:creationId xmlns:p14="http://schemas.microsoft.com/office/powerpoint/2010/main" val="1408225187"/>
+      </p:ext>
+    </p:extLst>
+  </p:cSld>
+  <p:clrMapOvr>
+    <a:masterClrMapping/>
+  </p:clrMapOvr>
+</p:sld>
+</file>
+
+<file path=ppt/slides/slide5.xml><?xml version="1.0" encoding="utf-8"?>
+<p:sld xmlns:a="http://schemas.openxmlformats.org/drawingml/2006/main" xmlns:r="http://schemas.openxmlformats.org/officeDocument/2006/relationships" xmlns:p="http://schemas.openxmlformats.org/presentationml/2006/main">
+  <p:cSld>
+    <p:spTree>
+      <p:nvGrpSpPr>
+        <p:cNvPr id="1" name=""/>
+        <p:cNvGrpSpPr/>
+        <p:nvPr/>
+      </p:nvGrpSpPr>
+      <p:grpSpPr>
+        <a:xfrm>
+          <a:off x="0" y="0"/>
+          <a:ext cx="0" cy="0"/>
+          <a:chOff x="0" y="0"/>
+          <a:chExt cx="0" cy="0"/>
+        </a:xfrm>
+      </p:grpSpPr>
+      <p:pic>
+        <p:nvPicPr>
+          <p:cNvPr id="3" name="Picture 2">
+            <a:extLst>
+              <a:ext uri="{FF2B5EF4-FFF2-40B4-BE49-F238E27FC236}">
+                <a16:creationId xmlns:a16="http://schemas.microsoft.com/office/drawing/2014/main" id="{10CDAAA1-1014-D7B0-EAD0-1A7BE1F60270}"/>
+              </a:ext>
+            </a:extLst>
+          </p:cNvPr>
+          <p:cNvPicPr>
+            <a:picLocks noChangeAspect="1"/>
+          </p:cNvPicPr>
+          <p:nvPr/>
+        </p:nvPicPr>
+        <p:blipFill>
+          <a:blip r:embed="rId2"/>
+          <a:stretch>
+            <a:fillRect/>
+          </a:stretch>
+        </p:blipFill>
+        <p:spPr>
+          <a:xfrm>
+            <a:off x="3206750" y="1028700"/>
+            <a:ext cx="5778500" cy="4800600"/>
+          </a:xfrm>
+          <a:prstGeom prst="rect">
+            <a:avLst/>
+          </a:prstGeom>
+        </p:spPr>
+      </p:pic>
+      <p:cxnSp>
+        <p:nvCxnSpPr>
+          <p:cNvPr id="10" name="Straight Connector 9">
+            <a:extLst>
+              <a:ext uri="{FF2B5EF4-FFF2-40B4-BE49-F238E27FC236}">
+                <a16:creationId xmlns:a16="http://schemas.microsoft.com/office/drawing/2014/main" id="{8FA7F0DB-5CA7-3FCC-C9EC-26EC13ABECF1}"/>
+              </a:ext>
+            </a:extLst>
+          </p:cNvPr>
+          <p:cNvCxnSpPr>
+            <a:cxnSpLocks/>
+          </p:cNvCxnSpPr>
+          <p:nvPr/>
+        </p:nvCxnSpPr>
+        <p:spPr>
+          <a:xfrm>
+            <a:off x="4536718" y="1711351"/>
+            <a:ext cx="3626778" cy="0"/>
+          </a:xfrm>
+          <a:prstGeom prst="line">
+            <a:avLst/>
+          </a:prstGeom>
+          <a:ln w="9525"/>
+        </p:spPr>
+        <p:style>
+          <a:lnRef idx="1">
+            <a:schemeClr val="dk1"/>
+          </a:lnRef>
+          <a:fillRef idx="0">
+            <a:schemeClr val="dk1"/>
+          </a:fillRef>
+          <a:effectRef idx="0">
+            <a:schemeClr val="dk1"/>
+          </a:effectRef>
+          <a:fontRef idx="minor">
+            <a:schemeClr val="tx1"/>
+          </a:fontRef>
+        </p:style>
+      </p:cxnSp>
+      <p:cxnSp>
+        <p:nvCxnSpPr>
+          <p:cNvPr id="11" name="Straight Connector 10">
+            <a:extLst>
+              <a:ext uri="{FF2B5EF4-FFF2-40B4-BE49-F238E27FC236}">
+                <a16:creationId xmlns:a16="http://schemas.microsoft.com/office/drawing/2014/main" id="{979EFCCE-6E46-5548-CCC2-7E170EE501A6}"/>
+              </a:ext>
+            </a:extLst>
+          </p:cNvPr>
+          <p:cNvCxnSpPr>
+            <a:cxnSpLocks/>
+          </p:cNvCxnSpPr>
+          <p:nvPr/>
+        </p:nvCxnSpPr>
+        <p:spPr>
+          <a:xfrm>
+            <a:off x="4536718" y="3107317"/>
+            <a:ext cx="3626778" cy="0"/>
+          </a:xfrm>
+          <a:prstGeom prst="line">
+            <a:avLst/>
+          </a:prstGeom>
+          <a:ln w="9525"/>
+        </p:spPr>
+        <p:style>
+          <a:lnRef idx="1">
+            <a:schemeClr val="dk1"/>
+          </a:lnRef>
+          <a:fillRef idx="0">
+            <a:schemeClr val="dk1"/>
+          </a:fillRef>
+          <a:effectRef idx="0">
+            <a:schemeClr val="dk1"/>
+          </a:effectRef>
+          <a:fontRef idx="minor">
+            <a:schemeClr val="tx1"/>
+          </a:fontRef>
+        </p:style>
+      </p:cxnSp>
+      <p:cxnSp>
+        <p:nvCxnSpPr>
+          <p:cNvPr id="12" name="Straight Connector 11">
+            <a:extLst>
+              <a:ext uri="{FF2B5EF4-FFF2-40B4-BE49-F238E27FC236}">
+                <a16:creationId xmlns:a16="http://schemas.microsoft.com/office/drawing/2014/main" id="{1A9B09CB-5C05-E3B7-B71D-B58C7A1D02EB}"/>
+              </a:ext>
+            </a:extLst>
+          </p:cNvPr>
+          <p:cNvCxnSpPr>
+            <a:cxnSpLocks/>
+          </p:cNvCxnSpPr>
+          <p:nvPr/>
+        </p:nvCxnSpPr>
+        <p:spPr>
+          <a:xfrm>
+            <a:off x="4536718" y="1512668"/>
+            <a:ext cx="3626778" cy="0"/>
+          </a:xfrm>
+          <a:prstGeom prst="line">
+            <a:avLst/>
+          </a:prstGeom>
+          <a:ln w="9525"/>
+        </p:spPr>
+        <p:style>
+          <a:lnRef idx="1">
+            <a:schemeClr val="dk1"/>
+          </a:lnRef>
+          <a:fillRef idx="0">
+            <a:schemeClr val="dk1"/>
+          </a:fillRef>
+          <a:effectRef idx="0">
+            <a:schemeClr val="dk1"/>
+          </a:effectRef>
+          <a:fontRef idx="minor">
+            <a:schemeClr val="tx1"/>
+          </a:fontRef>
+        </p:style>
+      </p:cxnSp>
+      <p:cxnSp>
+        <p:nvCxnSpPr>
+          <p:cNvPr id="14" name="Straight Connector 13">
+            <a:extLst>
+              <a:ext uri="{FF2B5EF4-FFF2-40B4-BE49-F238E27FC236}">
+                <a16:creationId xmlns:a16="http://schemas.microsoft.com/office/drawing/2014/main" id="{DFE96118-E1A9-457C-C82A-3E113235985C}"/>
+              </a:ext>
+            </a:extLst>
+          </p:cNvPr>
+          <p:cNvCxnSpPr/>
+          <p:nvPr/>
+        </p:nvCxnSpPr>
+        <p:spPr>
+          <a:xfrm>
+            <a:off x="3465871" y="1512668"/>
+            <a:ext cx="1017639" cy="0"/>
+          </a:xfrm>
+          <a:prstGeom prst="line">
+            <a:avLst/>
+          </a:prstGeom>
+          <a:ln w="12700">
+            <a:solidFill>
+              <a:srgbClr val="FF0000"/>
+            </a:solidFill>
+          </a:ln>
+        </p:spPr>
+        <p:style>
+          <a:lnRef idx="1">
+            <a:schemeClr val="accent1"/>
+          </a:lnRef>
+          <a:fillRef idx="0">
+            <a:schemeClr val="accent1"/>
+          </a:fillRef>
+          <a:effectRef idx="0">
+            <a:schemeClr val="accent1"/>
+          </a:effectRef>
+          <a:fontRef idx="minor">
+            <a:schemeClr val="tx1"/>
+          </a:fontRef>
+        </p:style>
+      </p:cxnSp>
+      <p:cxnSp>
+        <p:nvCxnSpPr>
+          <p:cNvPr id="15" name="Straight Connector 14">
+            <a:extLst>
+              <a:ext uri="{FF2B5EF4-FFF2-40B4-BE49-F238E27FC236}">
+                <a16:creationId xmlns:a16="http://schemas.microsoft.com/office/drawing/2014/main" id="{C47A4E09-DE1F-6D88-1BE2-C1FE2831F352}"/>
+              </a:ext>
+            </a:extLst>
+          </p:cNvPr>
+          <p:cNvCxnSpPr/>
+          <p:nvPr/>
+        </p:nvCxnSpPr>
+        <p:spPr>
+          <a:xfrm>
+            <a:off x="3465871" y="3107317"/>
+            <a:ext cx="1017639" cy="0"/>
+          </a:xfrm>
+          <a:prstGeom prst="line">
+            <a:avLst/>
+          </a:prstGeom>
+          <a:ln w="12700">
+            <a:solidFill>
+              <a:srgbClr val="FF0000"/>
+            </a:solidFill>
+          </a:ln>
+        </p:spPr>
+        <p:style>
+          <a:lnRef idx="1">
+            <a:schemeClr val="accent1"/>
+          </a:lnRef>
+          <a:fillRef idx="0">
+            <a:schemeClr val="accent1"/>
+          </a:fillRef>
+          <a:effectRef idx="0">
+            <a:schemeClr val="accent1"/>
+          </a:effectRef>
+          <a:fontRef idx="minor">
+            <a:schemeClr val="tx1"/>
+          </a:fontRef>
+        </p:style>
+      </p:cxnSp>
+      <p:cxnSp>
+        <p:nvCxnSpPr>
+          <p:cNvPr id="17" name="Straight Connector 16">
+            <a:extLst>
+              <a:ext uri="{FF2B5EF4-FFF2-40B4-BE49-F238E27FC236}">
+                <a16:creationId xmlns:a16="http://schemas.microsoft.com/office/drawing/2014/main" id="{7B82A56F-FEC7-1E9D-9560-3168AAF8B0FC}"/>
+              </a:ext>
+            </a:extLst>
+          </p:cNvPr>
+          <p:cNvCxnSpPr/>
+          <p:nvPr/>
+        </p:nvCxnSpPr>
+        <p:spPr>
+          <a:xfrm>
+            <a:off x="3465871" y="4491207"/>
+            <a:ext cx="1017639" cy="0"/>
+          </a:xfrm>
+          <a:prstGeom prst="line">
+            <a:avLst/>
+          </a:prstGeom>
+          <a:ln w="12700">
+            <a:solidFill>
+              <a:srgbClr val="FF0000"/>
+            </a:solidFill>
+          </a:ln>
+        </p:spPr>
+        <p:style>
+          <a:lnRef idx="1">
+            <a:schemeClr val="accent1"/>
+          </a:lnRef>
+          <a:fillRef idx="0">
+            <a:schemeClr val="accent1"/>
+          </a:fillRef>
+          <a:effectRef idx="0">
+            <a:schemeClr val="accent1"/>
+          </a:effectRef>
+          <a:fontRef idx="minor">
+            <a:schemeClr val="tx1"/>
+          </a:fontRef>
+        </p:style>
+      </p:cxnSp>
+    </p:spTree>
+    <p:extLst>
+      <p:ext uri="{BB962C8B-B14F-4D97-AF65-F5344CB8AC3E}">
+        <p14:creationId xmlns:p14="http://schemas.microsoft.com/office/powerpoint/2010/main" val="2197554375"/>
+      </p:ext>
+    </p:extLst>
+  </p:cSld>
+  <p:clrMapOvr>
+    <a:masterClrMapping/>
+  </p:clrMapOvr>
+</p:sld>
+</file>
+
+<file path=ppt/slides/slide6.xml><?xml version="1.0" encoding="utf-8"?>
+<p:sld xmlns:a="http://schemas.openxmlformats.org/drawingml/2006/main" xmlns:r="http://schemas.openxmlformats.org/officeDocument/2006/relationships" xmlns:p="http://schemas.openxmlformats.org/presentationml/2006/main">
+  <p:cSld>
+    <p:spTree>
+      <p:nvGrpSpPr>
+        <p:cNvPr id="1" name=""/>
+        <p:cNvGrpSpPr/>
+        <p:nvPr/>
+      </p:nvGrpSpPr>
+      <p:grpSpPr>
+        <a:xfrm>
+          <a:off x="0" y="0"/>
+          <a:ext cx="0" cy="0"/>
+          <a:chOff x="0" y="0"/>
+          <a:chExt cx="0" cy="0"/>
+        </a:xfrm>
+      </p:grpSpPr>
+      <p:pic>
+        <p:nvPicPr>
+          <p:cNvPr id="3" name="Picture 2">
+            <a:extLst>
+              <a:ext uri="{FF2B5EF4-FFF2-40B4-BE49-F238E27FC236}">
+                <a16:creationId xmlns:a16="http://schemas.microsoft.com/office/drawing/2014/main" id="{4079DC35-7D65-E7E8-3117-7B1C6E131C24}"/>
+              </a:ext>
+            </a:extLst>
+          </p:cNvPr>
+          <p:cNvPicPr>
+            <a:picLocks noChangeAspect="1"/>
+          </p:cNvPicPr>
+          <p:nvPr/>
+        </p:nvPicPr>
+        <p:blipFill>
+          <a:blip r:embed="rId2"/>
+          <a:stretch>
+            <a:fillRect/>
+          </a:stretch>
+        </p:blipFill>
+        <p:spPr>
+          <a:xfrm>
+            <a:off x="3206750" y="1028700"/>
+            <a:ext cx="5778500" cy="4800600"/>
+          </a:xfrm>
+          <a:prstGeom prst="rect">
+            <a:avLst/>
+          </a:prstGeom>
+        </p:spPr>
+      </p:pic>
+      <p:cxnSp>
+        <p:nvCxnSpPr>
+          <p:cNvPr id="4" name="Straight Connector 3">
+            <a:extLst>
+              <a:ext uri="{FF2B5EF4-FFF2-40B4-BE49-F238E27FC236}">
+                <a16:creationId xmlns:a16="http://schemas.microsoft.com/office/drawing/2014/main" id="{D08E009D-9E5F-6DE0-BCA0-E9409C5B0A0F}"/>
+              </a:ext>
+            </a:extLst>
+          </p:cNvPr>
+          <p:cNvCxnSpPr>
+            <a:cxnSpLocks/>
+          </p:cNvCxnSpPr>
+          <p:nvPr/>
+        </p:nvCxnSpPr>
+        <p:spPr>
+          <a:xfrm>
+            <a:off x="4536718" y="1738510"/>
+            <a:ext cx="3626778" cy="0"/>
+          </a:xfrm>
+          <a:prstGeom prst="line">
+            <a:avLst/>
+          </a:prstGeom>
+          <a:ln w="9525"/>
+        </p:spPr>
+        <p:style>
+          <a:lnRef idx="1">
+            <a:schemeClr val="dk1"/>
+          </a:lnRef>
+          <a:fillRef idx="0">
+            <a:schemeClr val="dk1"/>
+          </a:fillRef>
+          <a:effectRef idx="0">
+            <a:schemeClr val="dk1"/>
+          </a:effectRef>
+          <a:fontRef idx="minor">
+            <a:schemeClr val="tx1"/>
+          </a:fontRef>
+        </p:style>
+      </p:cxnSp>
+      <p:cxnSp>
+        <p:nvCxnSpPr>
+          <p:cNvPr id="5" name="Straight Connector 4">
+            <a:extLst>
+              <a:ext uri="{FF2B5EF4-FFF2-40B4-BE49-F238E27FC236}">
+                <a16:creationId xmlns:a16="http://schemas.microsoft.com/office/drawing/2014/main" id="{8641610C-999C-D74A-21B0-1C794F66E8CA}"/>
+              </a:ext>
+            </a:extLst>
+          </p:cNvPr>
+          <p:cNvCxnSpPr>
+            <a:cxnSpLocks/>
+          </p:cNvCxnSpPr>
+          <p:nvPr/>
+        </p:nvCxnSpPr>
+        <p:spPr>
+          <a:xfrm>
+            <a:off x="4536718" y="3116370"/>
+            <a:ext cx="3626778" cy="0"/>
+          </a:xfrm>
+          <a:prstGeom prst="line">
+            <a:avLst/>
+          </a:prstGeom>
+          <a:ln w="9525"/>
+        </p:spPr>
+        <p:style>
+          <a:lnRef idx="1">
+            <a:schemeClr val="dk1"/>
+          </a:lnRef>
+          <a:fillRef idx="0">
+            <a:schemeClr val="dk1"/>
+          </a:fillRef>
+          <a:effectRef idx="0">
+            <a:schemeClr val="dk1"/>
+          </a:effectRef>
+          <a:fontRef idx="minor">
+            <a:schemeClr val="tx1"/>
+          </a:fontRef>
+        </p:style>
+      </p:cxnSp>
+      <p:cxnSp>
+        <p:nvCxnSpPr>
+          <p:cNvPr id="6" name="Straight Connector 5">
+            <a:extLst>
+              <a:ext uri="{FF2B5EF4-FFF2-40B4-BE49-F238E27FC236}">
+                <a16:creationId xmlns:a16="http://schemas.microsoft.com/office/drawing/2014/main" id="{1F99F7A6-A740-085D-E498-D8EE768470E7}"/>
+              </a:ext>
+            </a:extLst>
+          </p:cNvPr>
+          <p:cNvCxnSpPr>
+            <a:cxnSpLocks/>
+          </p:cNvCxnSpPr>
+          <p:nvPr/>
+        </p:nvCxnSpPr>
+        <p:spPr>
+          <a:xfrm>
+            <a:off x="4536718" y="1575113"/>
+            <a:ext cx="3626778" cy="0"/>
+          </a:xfrm>
+          <a:prstGeom prst="line">
+            <a:avLst/>
+          </a:prstGeom>
+          <a:ln w="9525"/>
+        </p:spPr>
+        <p:style>
+          <a:lnRef idx="1">
+            <a:schemeClr val="dk1"/>
+          </a:lnRef>
+          <a:fillRef idx="0">
+            <a:schemeClr val="dk1"/>
+          </a:fillRef>
+          <a:effectRef idx="0">
+            <a:schemeClr val="dk1"/>
+          </a:effectRef>
+          <a:fontRef idx="minor">
+            <a:schemeClr val="tx1"/>
+          </a:fontRef>
+        </p:style>
+      </p:cxnSp>
+    </p:spTree>
+    <p:extLst>
+      <p:ext uri="{BB962C8B-B14F-4D97-AF65-F5344CB8AC3E}">
+        <p14:creationId xmlns:p14="http://schemas.microsoft.com/office/powerpoint/2010/main" val="2496504518"/>
+      </p:ext>
+    </p:extLst>
+  </p:cSld>
+  <p:clrMapOvr>
+    <a:masterClrMapping/>
+  </p:clrMapOvr>
+</p:sld>
+</file>
+
+<file path=ppt/slides/slide7.xml><?xml version="1.0" encoding="utf-8"?>
+<p:sld xmlns:a="http://schemas.openxmlformats.org/drawingml/2006/main" xmlns:r="http://schemas.openxmlformats.org/officeDocument/2006/relationships" xmlns:p="http://schemas.openxmlformats.org/presentationml/2006/main">
+  <p:cSld>
+    <p:spTree>
+      <p:nvGrpSpPr>
+        <p:cNvPr id="1" name=""/>
+        <p:cNvGrpSpPr/>
+        <p:nvPr/>
+      </p:nvGrpSpPr>
+      <p:grpSpPr>
+        <a:xfrm>
+          <a:off x="0" y="0"/>
+          <a:ext cx="0" cy="0"/>
+          <a:chOff x="0" y="0"/>
+          <a:chExt cx="0" cy="0"/>
+        </a:xfrm>
+      </p:grpSpPr>
+      <p:pic>
+        <p:nvPicPr>
+          <p:cNvPr id="7" name="Picture 6">
+            <a:extLst>
+              <a:ext uri="{FF2B5EF4-FFF2-40B4-BE49-F238E27FC236}">
+                <a16:creationId xmlns:a16="http://schemas.microsoft.com/office/drawing/2014/main" id="{321191FE-10CD-042D-6537-4B46847C03BF}"/>
+              </a:ext>
+            </a:extLst>
+          </p:cNvPr>
+          <p:cNvPicPr>
+            <a:picLocks noChangeAspect="1"/>
+          </p:cNvPicPr>
+          <p:nvPr/>
+        </p:nvPicPr>
+        <p:blipFill>
+          <a:blip r:embed="rId2"/>
+          <a:stretch>
+            <a:fillRect/>
+          </a:stretch>
+        </p:blipFill>
+        <p:spPr>
+          <a:xfrm>
+            <a:off x="3206750" y="1028700"/>
+            <a:ext cx="5778500" cy="4800600"/>
+          </a:xfrm>
+          <a:prstGeom prst="rect">
+            <a:avLst/>
+          </a:prstGeom>
+        </p:spPr>
+      </p:pic>
+      <p:cxnSp>
+        <p:nvCxnSpPr>
+          <p:cNvPr id="4" name="Straight Connector 3">
+            <a:extLst>
+              <a:ext uri="{FF2B5EF4-FFF2-40B4-BE49-F238E27FC236}">
+                <a16:creationId xmlns:a16="http://schemas.microsoft.com/office/drawing/2014/main" id="{D08E009D-9E5F-6DE0-BCA0-E9409C5B0A0F}"/>
+              </a:ext>
+            </a:extLst>
+          </p:cNvPr>
+          <p:cNvCxnSpPr>
+            <a:cxnSpLocks/>
+          </p:cNvCxnSpPr>
+          <p:nvPr/>
+        </p:nvCxnSpPr>
+        <p:spPr>
+          <a:xfrm>
+            <a:off x="4536718" y="1656214"/>
+            <a:ext cx="3626778" cy="0"/>
+          </a:xfrm>
+          <a:prstGeom prst="line">
+            <a:avLst/>
+          </a:prstGeom>
+          <a:ln w="9525"/>
+        </p:spPr>
+        <p:style>
+          <a:lnRef idx="1">
+            <a:schemeClr val="dk1"/>
+          </a:lnRef>
+          <a:fillRef idx="0">
+            <a:schemeClr val="dk1"/>
+          </a:fillRef>
+          <a:effectRef idx="0">
+            <a:schemeClr val="dk1"/>
+          </a:effectRef>
+          <a:fontRef idx="minor">
+            <a:schemeClr val="tx1"/>
+          </a:fontRef>
+        </p:style>
+      </p:cxnSp>
+      <p:cxnSp>
+        <p:nvCxnSpPr>
+          <p:cNvPr id="5" name="Straight Connector 4">
+            <a:extLst>
+              <a:ext uri="{FF2B5EF4-FFF2-40B4-BE49-F238E27FC236}">
+                <a16:creationId xmlns:a16="http://schemas.microsoft.com/office/drawing/2014/main" id="{8641610C-999C-D74A-21B0-1C794F66E8CA}"/>
+              </a:ext>
+            </a:extLst>
+          </p:cNvPr>
+          <p:cNvCxnSpPr>
+            <a:cxnSpLocks/>
+          </p:cNvCxnSpPr>
+          <p:nvPr/>
+        </p:nvCxnSpPr>
+        <p:spPr>
+          <a:xfrm>
+            <a:off x="4536718" y="3280962"/>
+            <a:ext cx="3626778" cy="0"/>
+          </a:xfrm>
+          <a:prstGeom prst="line">
+            <a:avLst/>
+          </a:prstGeom>
+          <a:ln w="9525"/>
+        </p:spPr>
+        <p:style>
+          <a:lnRef idx="1">
+            <a:schemeClr val="dk1"/>
+          </a:lnRef>
+          <a:fillRef idx="0">
+            <a:schemeClr val="dk1"/>
+          </a:fillRef>
+          <a:effectRef idx="0">
+            <a:schemeClr val="dk1"/>
+          </a:effectRef>
+          <a:fontRef idx="minor">
+            <a:schemeClr val="tx1"/>
+          </a:fontRef>
+        </p:style>
+      </p:cxnSp>
+      <p:cxnSp>
+        <p:nvCxnSpPr>
+          <p:cNvPr id="6" name="Straight Connector 5">
+            <a:extLst>
+              <a:ext uri="{FF2B5EF4-FFF2-40B4-BE49-F238E27FC236}">
+                <a16:creationId xmlns:a16="http://schemas.microsoft.com/office/drawing/2014/main" id="{1F99F7A6-A740-085D-E498-D8EE768470E7}"/>
+              </a:ext>
+            </a:extLst>
+          </p:cNvPr>
+          <p:cNvCxnSpPr>
+            <a:cxnSpLocks/>
+          </p:cNvCxnSpPr>
+          <p:nvPr/>
+        </p:nvCxnSpPr>
+        <p:spPr>
+          <a:xfrm>
+            <a:off x="4536718" y="1520249"/>
+            <a:ext cx="3626778" cy="0"/>
+          </a:xfrm>
+          <a:prstGeom prst="line">
+            <a:avLst/>
+          </a:prstGeom>
+          <a:ln w="9525"/>
+        </p:spPr>
+        <p:style>
+          <a:lnRef idx="1">
+            <a:schemeClr val="dk1"/>
+          </a:lnRef>
+          <a:fillRef idx="0">
+            <a:schemeClr val="dk1"/>
+          </a:fillRef>
+          <a:effectRef idx="0">
+            <a:schemeClr val="dk1"/>
+          </a:effectRef>
+          <a:fontRef idx="minor">
+            <a:schemeClr val="tx1"/>
+          </a:fontRef>
+        </p:style>
+      </p:cxnSp>
+    </p:spTree>
+    <p:extLst>
+      <p:ext uri="{BB962C8B-B14F-4D97-AF65-F5344CB8AC3E}">
+        <p14:creationId xmlns:p14="http://schemas.microsoft.com/office/powerpoint/2010/main" val="1744351664"/>
+      </p:ext>
+    </p:extLst>
+  </p:cSld>
+  <p:clrMapOvr>
+    <a:masterClrMapping/>
+  </p:clrMapOvr>
+</p:sld>
+</file>
+
 <file path=ppt/theme/theme1.xml><?xml version="1.0" encoding="utf-8"?>
 <a:theme xmlns:a="http://schemas.openxmlformats.org/drawingml/2006/main" name="Office Theme">
   <a:themeElements>

</xml_diff>